<commit_message>
Added businessmodels, pitch tips
</commit_message>
<xml_diff>
--- a/data/Streak and points.pptx
+++ b/data/Streak and points.pptx
@@ -104,6 +104,20 @@
       </a:defRPr>
     </a:lvl9pPr>
   </p:defaultTextStyle>
+  <p:extLst>
+    <p:ext uri="{521415D9-36F7-43E2-AB2F-B90AF26B5E84}">
+      <p14:sectionLst xmlns:p14="http://schemas.microsoft.com/office/powerpoint/2010/main">
+        <p14:section name="Leveling und Exp curve" id="{C215A535-506F-4641-914D-5B3A31BF75BD}">
+          <p14:sldIdLst>
+            <p14:sldId id="256"/>
+          </p14:sldIdLst>
+        </p14:section>
+      </p14:sectionLst>
+    </p:ext>
+    <p:ext uri="{EFAFB233-063F-42B5-8137-9DF3F51BA10A}">
+      <p15:sldGuideLst xmlns:p15="http://schemas.microsoft.com/office/powerpoint/2012/main"/>
+    </p:ext>
+  </p:extLst>
 </p:presentation>
 </file>
 
@@ -3367,50 +3381,6 @@
       </p:sp>
       <p:sp>
         <p:nvSpPr>
-          <p:cNvPr id="5" name="Textfeld 4">
-            <a:extLst>
-              <a:ext uri="{FF2B5EF4-FFF2-40B4-BE49-F238E27FC236}">
-                <a16:creationId xmlns:a16="http://schemas.microsoft.com/office/drawing/2014/main" id="{B09CBCF4-133F-03BF-BE61-A7AEA9E204E9}"/>
-              </a:ext>
-            </a:extLst>
-          </p:cNvPr>
-          <p:cNvSpPr txBox="1"/>
-          <p:nvPr/>
-        </p:nvSpPr>
-        <p:spPr>
-          <a:xfrm>
-            <a:off x="8825619" y="334978"/>
-            <a:ext cx="1984219" cy="369332"/>
-          </a:xfrm>
-          <a:prstGeom prst="rect">
-            <a:avLst/>
-          </a:prstGeom>
-          <a:noFill/>
-        </p:spPr>
-        <p:txBody>
-          <a:bodyPr wrap="square" rtlCol="0">
-            <a:spAutoFit/>
-          </a:bodyPr>
-          <a:lstStyle/>
-          <a:p>
-            <a:r>
-              <a:rPr lang="de-DE" b="1" dirty="0" err="1"/>
-              <a:t>streaks</a:t>
-            </a:r>
-            <a:r>
-              <a:rPr lang="de-DE" b="1" dirty="0"/>
-              <a:t> </a:t>
-            </a:r>
-            <a:r>
-              <a:rPr lang="de-DE" b="1" dirty="0" err="1"/>
-              <a:t>system</a:t>
-            </a:r>
-            <a:endParaRPr lang="de-DE" b="1" dirty="0"/>
-          </a:p>
-        </p:txBody>
-      </p:sp>
-      <p:sp>
-        <p:nvSpPr>
           <p:cNvPr id="6" name="Textfeld 5">
             <a:extLst>
               <a:ext uri="{FF2B5EF4-FFF2-40B4-BE49-F238E27FC236}">
@@ -4059,7 +4029,7 @@
         </p:nvSpPr>
         <p:spPr>
           <a:xfrm>
-            <a:off x="4908504" y="731299"/>
+            <a:off x="4893665" y="713763"/>
             <a:ext cx="2720553" cy="369332"/>
           </a:xfrm>
           <a:prstGeom prst="rect">
@@ -4102,7 +4072,7 @@
         </p:blipFill>
         <p:spPr>
           <a:xfrm>
-            <a:off x="4912764" y="1063770"/>
+            <a:off x="4897925" y="1078776"/>
             <a:ext cx="2716293" cy="795856"/>
           </a:xfrm>
           <a:prstGeom prst="rect">
@@ -4316,6 +4286,76 @@
             <a:r>
               <a:rPr lang="de-DE" dirty="0"/>
               <a:t>alle</a:t>
+            </a:r>
+          </a:p>
+        </p:txBody>
+      </p:sp>
+      <p:sp>
+        <p:nvSpPr>
+          <p:cNvPr id="2" name="Textfeld 1">
+            <a:extLst>
+              <a:ext uri="{FF2B5EF4-FFF2-40B4-BE49-F238E27FC236}">
+                <a16:creationId xmlns:a16="http://schemas.microsoft.com/office/drawing/2014/main" id="{4CB3E626-2930-06A3-57E1-C19FBB3361B5}"/>
+              </a:ext>
+            </a:extLst>
+          </p:cNvPr>
+          <p:cNvSpPr txBox="1"/>
+          <p:nvPr/>
+        </p:nvSpPr>
+        <p:spPr>
+          <a:xfrm>
+            <a:off x="5851235" y="338553"/>
+            <a:ext cx="836832" cy="369332"/>
+          </a:xfrm>
+          <a:prstGeom prst="rect">
+            <a:avLst/>
+          </a:prstGeom>
+          <a:noFill/>
+        </p:spPr>
+        <p:txBody>
+          <a:bodyPr wrap="none" rtlCol="0">
+            <a:spAutoFit/>
+          </a:bodyPr>
+          <a:lstStyle/>
+          <a:p>
+            <a:r>
+              <a:rPr lang="de-DE" b="1" dirty="0"/>
+              <a:t>Vers.1:</a:t>
+            </a:r>
+          </a:p>
+        </p:txBody>
+      </p:sp>
+      <p:sp>
+        <p:nvSpPr>
+          <p:cNvPr id="3" name="Textfeld 2">
+            <a:extLst>
+              <a:ext uri="{FF2B5EF4-FFF2-40B4-BE49-F238E27FC236}">
+                <a16:creationId xmlns:a16="http://schemas.microsoft.com/office/drawing/2014/main" id="{A6E1838B-8306-6BFC-2680-8657ACBE34F2}"/>
+              </a:ext>
+            </a:extLst>
+          </p:cNvPr>
+          <p:cNvSpPr txBox="1"/>
+          <p:nvPr/>
+        </p:nvSpPr>
+        <p:spPr>
+          <a:xfrm>
+            <a:off x="9943246" y="331412"/>
+            <a:ext cx="836832" cy="369332"/>
+          </a:xfrm>
+          <a:prstGeom prst="rect">
+            <a:avLst/>
+          </a:prstGeom>
+          <a:noFill/>
+        </p:spPr>
+        <p:txBody>
+          <a:bodyPr wrap="none" rtlCol="0">
+            <a:spAutoFit/>
+          </a:bodyPr>
+          <a:lstStyle/>
+          <a:p>
+            <a:r>
+              <a:rPr lang="de-DE" b="1" dirty="0"/>
+              <a:t>Vers.2:</a:t>
             </a:r>
           </a:p>
         </p:txBody>

</xml_diff>